<commit_message>
feat(backend): Setup Prisma SQLite DB and Authentication APIs
</commit_message>
<xml_diff>
--- a/Bhao_Presentation.pptx
+++ b/Bhao_Presentation.pptx
@@ -316,7 +316,7 @@
           <a:p>
             <a:fld id="{5BCAD085-E8A6-8845-BD4E-CB4CCA059FC4}" type="datetimeFigureOut">
               <a:rPr lang="en-US" smtClean="0"/>
-              <a:t>2/15/26</a:t>
+              <a:t>2/17/26</a:t>
             </a:fld>
             <a:endParaRPr lang="en-US"/>
           </a:p>
@@ -484,7 +484,7 @@
           <a:p>
             <a:fld id="{5BCAD085-E8A6-8845-BD4E-CB4CCA059FC4}" type="datetimeFigureOut">
               <a:rPr lang="en-US" smtClean="0"/>
-              <a:t>2/15/26</a:t>
+              <a:t>2/17/26</a:t>
             </a:fld>
             <a:endParaRPr lang="en-US"/>
           </a:p>
@@ -662,7 +662,7 @@
           <a:p>
             <a:fld id="{5BCAD085-E8A6-8845-BD4E-CB4CCA059FC4}" type="datetimeFigureOut">
               <a:rPr lang="en-US" smtClean="0"/>
-              <a:t>2/15/26</a:t>
+              <a:t>2/17/26</a:t>
             </a:fld>
             <a:endParaRPr lang="en-US"/>
           </a:p>
@@ -830,7 +830,7 @@
           <a:p>
             <a:fld id="{5BCAD085-E8A6-8845-BD4E-CB4CCA059FC4}" type="datetimeFigureOut">
               <a:rPr lang="en-US" smtClean="0"/>
-              <a:t>2/15/26</a:t>
+              <a:t>2/17/26</a:t>
             </a:fld>
             <a:endParaRPr lang="en-US"/>
           </a:p>
@@ -1075,7 +1075,7 @@
           <a:p>
             <a:fld id="{5BCAD085-E8A6-8845-BD4E-CB4CCA059FC4}" type="datetimeFigureOut">
               <a:rPr lang="en-US" smtClean="0"/>
-              <a:t>2/15/26</a:t>
+              <a:t>2/17/26</a:t>
             </a:fld>
             <a:endParaRPr lang="en-US"/>
           </a:p>
@@ -1360,7 +1360,7 @@
           <a:p>
             <a:fld id="{5BCAD085-E8A6-8845-BD4E-CB4CCA059FC4}" type="datetimeFigureOut">
               <a:rPr lang="en-US" smtClean="0"/>
-              <a:t>2/15/26</a:t>
+              <a:t>2/17/26</a:t>
             </a:fld>
             <a:endParaRPr lang="en-US"/>
           </a:p>
@@ -1779,7 +1779,7 @@
           <a:p>
             <a:fld id="{5BCAD085-E8A6-8845-BD4E-CB4CCA059FC4}" type="datetimeFigureOut">
               <a:rPr lang="en-US" smtClean="0"/>
-              <a:t>2/15/26</a:t>
+              <a:t>2/17/26</a:t>
             </a:fld>
             <a:endParaRPr lang="en-US"/>
           </a:p>
@@ -1896,7 +1896,7 @@
           <a:p>
             <a:fld id="{5BCAD085-E8A6-8845-BD4E-CB4CCA059FC4}" type="datetimeFigureOut">
               <a:rPr lang="en-US" smtClean="0"/>
-              <a:t>2/15/26</a:t>
+              <a:t>2/17/26</a:t>
             </a:fld>
             <a:endParaRPr lang="en-US"/>
           </a:p>
@@ -1991,7 +1991,7 @@
           <a:p>
             <a:fld id="{5BCAD085-E8A6-8845-BD4E-CB4CCA059FC4}" type="datetimeFigureOut">
               <a:rPr lang="en-US" smtClean="0"/>
-              <a:t>2/15/26</a:t>
+              <a:t>2/17/26</a:t>
             </a:fld>
             <a:endParaRPr lang="en-US"/>
           </a:p>
@@ -2266,7 +2266,7 @@
           <a:p>
             <a:fld id="{5BCAD085-E8A6-8845-BD4E-CB4CCA059FC4}" type="datetimeFigureOut">
               <a:rPr lang="en-US" smtClean="0"/>
-              <a:t>2/15/26</a:t>
+              <a:t>2/17/26</a:t>
             </a:fld>
             <a:endParaRPr lang="en-US"/>
           </a:p>
@@ -2518,7 +2518,7 @@
           <a:p>
             <a:fld id="{5BCAD085-E8A6-8845-BD4E-CB4CCA059FC4}" type="datetimeFigureOut">
               <a:rPr lang="en-US" smtClean="0"/>
-              <a:t>2/15/26</a:t>
+              <a:t>2/17/26</a:t>
             </a:fld>
             <a:endParaRPr lang="en-US"/>
           </a:p>
@@ -2729,7 +2729,7 @@
           <a:p>
             <a:fld id="{5BCAD085-E8A6-8845-BD4E-CB4CCA059FC4}" type="datetimeFigureOut">
               <a:rPr lang="en-US" smtClean="0"/>
-              <a:t>2/15/26</a:t>
+              <a:t>2/17/26</a:t>
             </a:fld>
             <a:endParaRPr lang="en-US"/>
           </a:p>
@@ -9576,7 +9576,7 @@
         <p:spPr>
           <a:xfrm>
             <a:off x="1645920" y="2377440"/>
-            <a:ext cx="3931920" cy="914400"/>
+            <a:ext cx="3931920" cy="692497"/>
           </a:xfrm>
           <a:prstGeom prst="rect">
             <a:avLst/>
@@ -9598,7 +9598,32 @@
               </a:defRPr>
             </a:pPr>
             <a:r>
-              <a:t>Pakistani consumers have no unified platform to compare prices across multiple e-commerce stores like Daraz, PakStyle, and iShopping.</a:t>
+              <a:rPr dirty="0"/>
+              <a:t>Pakistani consumers have no unified platform to compare prices across multiple e-commerce stores like </a:t>
+            </a:r>
+            <a:r>
+              <a:rPr dirty="0" err="1"/>
+              <a:t>Daraz</a:t>
+            </a:r>
+            <a:r>
+              <a:rPr dirty="0"/>
+              <a:t>, </a:t>
+            </a:r>
+            <a:r>
+              <a:rPr lang="en-US" dirty="0" err="1"/>
+              <a:t>telemart</a:t>
+            </a:r>
+            <a:r>
+              <a:rPr dirty="0"/>
+              <a:t>, and </a:t>
+            </a:r>
+            <a:r>
+              <a:rPr lang="en-US" dirty="0" err="1"/>
+              <a:t>shopive</a:t>
+            </a:r>
+            <a:r>
+              <a:rPr dirty="0"/>
+              <a:t>.</a:t>
             </a:r>
           </a:p>
         </p:txBody>

</xml_diff>